<commit_message>
just made a few small updates
</commit_message>
<xml_diff>
--- a/ProjectDemo.pptx
+++ b/ProjectDemo.pptx
@@ -5039,7 +5039,7 @@
           <p:nvPr>
             <p:extLst>
               <p:ext uri="{D42A27DB-BD31-4B8C-83A1-F6EECF244321}">
-                <p14:modId xmlns:p14="http://schemas.microsoft.com/office/powerpoint/2010/main" val="2268222002"/>
+                <p14:modId xmlns:p14="http://schemas.microsoft.com/office/powerpoint/2010/main" val="3120936357"/>
               </p:ext>
             </p:extLst>
           </p:nvPr>
@@ -5065,7 +5065,11 @@
                     <a:p>
                       <a:r>
                         <a:rPr lang="en-US" sz="1400" dirty="0" err="1" smtClean="0"/>
-                        <a:t>CarsForSale</a:t>
+                        <a:t>C</a:t>
+                      </a:r>
+                      <a:r>
+                        <a:rPr lang="en-US" sz="1400" smtClean="0"/>
+                        <a:t>arsForSale</a:t>
                       </a:r>
                       <a:endParaRPr lang="en-US" sz="1400" dirty="0"/>
                     </a:p>

</xml_diff>